<commit_message>
Updated name references pt.2
</commit_message>
<xml_diff>
--- a/doc/Volvo_Truck_Analysis.pptx
+++ b/doc/Volvo_Truck_Analysis.pptx
@@ -111,12 +111,18 @@
       </a:defRPr>
     </a:lvl9pPr>
   </p:defaultTextStyle>
+  <p:extLst>
+    <p:ext uri="{EFAFB233-063F-42B5-8137-9DF3F51BA10A}">
+      <p15:sldGuideLst xmlns:p15="http://schemas.microsoft.com/office/powerpoint/2012/main"/>
+    </p:ext>
+  </p:extLst>
 </p:presentation>
 </file>
 
 <file path=ppt/revisionInfo.xml><?xml version="1.0" encoding="utf-8"?>
 <p1510:revInfo xmlns:a="http://schemas.openxmlformats.org/drawingml/2006/main" xmlns:r="http://schemas.openxmlformats.org/officeDocument/2006/relationships" xmlns:p1510="http://schemas.microsoft.com/office/powerpoint/2015/10/main">
   <p1510:revLst>
+    <p1510:client id="{E6B39CCD-B58E-4F36-88FB-6C6E5D4C0A38}" v="1" dt="2023-09-16T03:06:11.648"/>
     <p1510:client id="{F3A95362-8316-4679-999E-79E4B5AE9EDB}" v="19" dt="2019-09-26T20:47:54.116"/>
   </p1510:revLst>
 </p1510:revInfo>
@@ -328,6 +334,45 @@
       </pc:sldChg>
     </pc:docChg>
   </pc:docChgLst>
+  <pc:docChgLst>
+    <pc:chgData name="Christopher Thacker" userId="e678920bcc41ac03" providerId="Windows Live" clId="Web-{E6B39CCD-B58E-4F36-88FB-6C6E5D4C0A38}"/>
+    <pc:docChg chg="modSld">
+      <pc:chgData name="Christopher Thacker" userId="e678920bcc41ac03" providerId="Windows Live" clId="Web-{E6B39CCD-B58E-4F36-88FB-6C6E5D4C0A38}" dt="2023-09-16T03:06:11.648" v="0"/>
+      <pc:docMkLst>
+        <pc:docMk/>
+      </pc:docMkLst>
+      <pc:sldChg chg="modSp">
+        <pc:chgData name="Christopher Thacker" userId="e678920bcc41ac03" providerId="Windows Live" clId="Web-{E6B39CCD-B58E-4F36-88FB-6C6E5D4C0A38}" dt="2023-09-16T03:06:11.648" v="0"/>
+        <pc:sldMkLst>
+          <pc:docMk/>
+          <pc:sldMk cId="1995572332" sldId="256"/>
+        </pc:sldMkLst>
+        <pc:spChg chg="mod">
+          <ac:chgData name="Christopher Thacker" userId="e678920bcc41ac03" providerId="Windows Live" clId="Web-{E6B39CCD-B58E-4F36-88FB-6C6E5D4C0A38}" dt="2023-09-16T03:06:11.648" v="0"/>
+          <ac:spMkLst>
+            <pc:docMk/>
+            <pc:sldMk cId="1995572332" sldId="256"/>
+            <ac:spMk id="3" creationId="{EAFEB941-644F-4DCE-9934-B4F7F6CDF6A1}"/>
+          </ac:spMkLst>
+        </pc:spChg>
+      </pc:sldChg>
+      <pc:sldChg chg="modSp">
+        <pc:chgData name="Christopher Thacker" userId="e678920bcc41ac03" providerId="Windows Live" clId="Web-{E6B39CCD-B58E-4F36-88FB-6C6E5D4C0A38}" dt="2023-09-16T03:06:11.648" v="0"/>
+        <pc:sldMkLst>
+          <pc:docMk/>
+          <pc:sldMk cId="1359210314" sldId="264"/>
+        </pc:sldMkLst>
+        <pc:spChg chg="mod">
+          <ac:chgData name="Christopher Thacker" userId="e678920bcc41ac03" providerId="Windows Live" clId="Web-{E6B39CCD-B58E-4F36-88FB-6C6E5D4C0A38}" dt="2023-09-16T03:06:11.648" v="0"/>
+          <ac:spMkLst>
+            <pc:docMk/>
+            <pc:sldMk cId="1359210314" sldId="264"/>
+            <ac:spMk id="16" creationId="{EB63C5C3-D0B9-4BF1-BCF6-46FE3EA455D8}"/>
+          </ac:spMkLst>
+        </pc:spChg>
+      </pc:sldChg>
+    </pc:docChg>
+  </pc:docChgLst>
 </pc:chgInfo>
 </file>
 
@@ -523,7 +568,7 @@
             <a:fld id="{B61BEF0D-F0BB-DE4B-95CE-6DB70DBA9567}" type="datetimeFigureOut">
               <a:rPr lang="en-US" dirty="0"/>
               <a:pPr/>
-              <a:t>9/26/2019</a:t>
+              <a:t>9/15/2023</a:t>
             </a:fld>
             <a:endParaRPr lang="en-US" dirty="0"/>
           </a:p>
@@ -956,7 +1001,7 @@
             <a:fld id="{B61BEF0D-F0BB-DE4B-95CE-6DB70DBA9567}" type="datetimeFigureOut">
               <a:rPr lang="en-US" dirty="0"/>
               <a:pPr/>
-              <a:t>9/26/2019</a:t>
+              <a:t>9/15/2023</a:t>
             </a:fld>
             <a:endParaRPr lang="en-US" dirty="0"/>
           </a:p>
@@ -1203,7 +1248,7 @@
             <a:fld id="{B61BEF0D-F0BB-DE4B-95CE-6DB70DBA9567}" type="datetimeFigureOut">
               <a:rPr lang="en-US" dirty="0"/>
               <a:pPr/>
-              <a:t>9/26/2019</a:t>
+              <a:t>9/15/2023</a:t>
             </a:fld>
             <a:endParaRPr lang="en-US" dirty="0"/>
           </a:p>
@@ -1508,7 +1553,7 @@
             <a:fld id="{B61BEF0D-F0BB-DE4B-95CE-6DB70DBA9567}" type="datetimeFigureOut">
               <a:rPr lang="en-US" dirty="0"/>
               <a:pPr/>
-              <a:t>9/26/2019</a:t>
+              <a:t>9/15/2023</a:t>
             </a:fld>
             <a:endParaRPr lang="en-US" dirty="0"/>
           </a:p>
@@ -1823,7 +1868,7 @@
             <a:fld id="{B61BEF0D-F0BB-DE4B-95CE-6DB70DBA9567}" type="datetimeFigureOut">
               <a:rPr lang="en-US" dirty="0"/>
               <a:pPr/>
-              <a:t>9/26/2019</a:t>
+              <a:t>9/15/2023</a:t>
             </a:fld>
             <a:endParaRPr lang="en-US" dirty="0"/>
           </a:p>
@@ -2122,7 +2167,7 @@
             <a:fld id="{B61BEF0D-F0BB-DE4B-95CE-6DB70DBA9567}" type="datetimeFigureOut">
               <a:rPr lang="en-US" dirty="0"/>
               <a:pPr/>
-              <a:t>9/26/2019</a:t>
+              <a:t>9/15/2023</a:t>
             </a:fld>
             <a:endParaRPr lang="en-US" dirty="0"/>
           </a:p>
@@ -2486,7 +2531,7 @@
             <a:fld id="{B61BEF0D-F0BB-DE4B-95CE-6DB70DBA9567}" type="datetimeFigureOut">
               <a:rPr lang="en-US" dirty="0"/>
               <a:pPr/>
-              <a:t>9/26/2019</a:t>
+              <a:t>9/15/2023</a:t>
             </a:fld>
             <a:endParaRPr lang="en-US" dirty="0"/>
           </a:p>
@@ -2657,7 +2702,7 @@
             <a:fld id="{B61BEF0D-F0BB-DE4B-95CE-6DB70DBA9567}" type="datetimeFigureOut">
               <a:rPr lang="en-US" dirty="0"/>
               <a:pPr/>
-              <a:t>9/26/2019</a:t>
+              <a:t>9/15/2023</a:t>
             </a:fld>
             <a:endParaRPr lang="en-US" dirty="0"/>
           </a:p>
@@ -2834,7 +2879,7 @@
             <a:fld id="{B61BEF0D-F0BB-DE4B-95CE-6DB70DBA9567}" type="datetimeFigureOut">
               <a:rPr lang="en-US" dirty="0"/>
               <a:pPr/>
-              <a:t>9/26/2019</a:t>
+              <a:t>9/15/2023</a:t>
             </a:fld>
             <a:endParaRPr lang="en-US" dirty="0"/>
           </a:p>
@@ -3001,7 +3046,7 @@
             <a:fld id="{B61BEF0D-F0BB-DE4B-95CE-6DB70DBA9567}" type="datetimeFigureOut">
               <a:rPr lang="en-US" dirty="0"/>
               <a:pPr/>
-              <a:t>9/26/2019</a:t>
+              <a:t>9/15/2023</a:t>
             </a:fld>
             <a:endParaRPr lang="en-US" dirty="0"/>
           </a:p>
@@ -3248,7 +3293,7 @@
             <a:fld id="{B61BEF0D-F0BB-DE4B-95CE-6DB70DBA9567}" type="datetimeFigureOut">
               <a:rPr lang="en-US" dirty="0"/>
               <a:pPr/>
-              <a:t>9/26/2019</a:t>
+              <a:t>9/15/2023</a:t>
             </a:fld>
             <a:endParaRPr lang="en-US" dirty="0"/>
           </a:p>
@@ -3481,7 +3526,7 @@
             <a:fld id="{B61BEF0D-F0BB-DE4B-95CE-6DB70DBA9567}" type="datetimeFigureOut">
               <a:rPr lang="en-US" dirty="0"/>
               <a:pPr/>
-              <a:t>9/26/2019</a:t>
+              <a:t>9/15/2023</a:t>
             </a:fld>
             <a:endParaRPr lang="en-US" dirty="0"/>
           </a:p>
@@ -3860,7 +3905,7 @@
             <a:fld id="{B61BEF0D-F0BB-DE4B-95CE-6DB70DBA9567}" type="datetimeFigureOut">
               <a:rPr lang="en-US" dirty="0"/>
               <a:pPr/>
-              <a:t>9/26/2019</a:t>
+              <a:t>9/15/2023</a:t>
             </a:fld>
             <a:endParaRPr lang="en-US" dirty="0"/>
           </a:p>
@@ -3975,7 +4020,7 @@
             <a:fld id="{B61BEF0D-F0BB-DE4B-95CE-6DB70DBA9567}" type="datetimeFigureOut">
               <a:rPr lang="en-US" dirty="0"/>
               <a:pPr/>
-              <a:t>9/26/2019</a:t>
+              <a:t>9/15/2023</a:t>
             </a:fld>
             <a:endParaRPr lang="en-US" dirty="0"/>
           </a:p>
@@ -4067,7 +4112,7 @@
             <a:fld id="{B61BEF0D-F0BB-DE4B-95CE-6DB70DBA9567}" type="datetimeFigureOut">
               <a:rPr lang="en-US" dirty="0"/>
               <a:pPr/>
-              <a:t>9/26/2019</a:t>
+              <a:t>9/15/2023</a:t>
             </a:fld>
             <a:endParaRPr lang="en-US" dirty="0"/>
           </a:p>
@@ -4319,7 +4364,7 @@
             <a:fld id="{B61BEF0D-F0BB-DE4B-95CE-6DB70DBA9567}" type="datetimeFigureOut">
               <a:rPr lang="en-US" dirty="0"/>
               <a:pPr/>
-              <a:t>9/26/2019</a:t>
+              <a:t>9/15/2023</a:t>
             </a:fld>
             <a:endParaRPr lang="en-US" dirty="0"/>
           </a:p>
@@ -4599,7 +4644,7 @@
             <a:fld id="{B61BEF0D-F0BB-DE4B-95CE-6DB70DBA9567}" type="datetimeFigureOut">
               <a:rPr lang="en-US" dirty="0"/>
               <a:pPr/>
-              <a:t>9/26/2019</a:t>
+              <a:t>9/15/2023</a:t>
             </a:fld>
             <a:endParaRPr lang="en-US" dirty="0"/>
           </a:p>
@@ -5002,7 +5047,7 @@
             <a:fld id="{B61BEF0D-F0BB-DE4B-95CE-6DB70DBA9567}" type="datetimeFigureOut">
               <a:rPr lang="en-US" dirty="0"/>
               <a:pPr/>
-              <a:t>9/26/2019</a:t>
+              <a:t>9/15/2023</a:t>
             </a:fld>
             <a:endParaRPr lang="en-US" dirty="0"/>
           </a:p>
@@ -6063,18 +6108,8 @@
                   </a:schemeClr>
                 </a:solidFill>
               </a:rPr>
-              <a:t>Christopher Thacker</a:t>
-            </a:r>
-          </a:p>
-          <a:p>
-            <a:pPr algn="ctr"/>
-            <a:endParaRPr lang="en-US" dirty="0">
-              <a:solidFill>
-                <a:schemeClr val="tx2">
-                  <a:lumMod val="75000"/>
-                </a:schemeClr>
-              </a:solidFill>
-            </a:endParaRPr>
+              <a:t>Chris T.</a:t>
+            </a:r>
           </a:p>
           <a:p>
             <a:pPr algn="ctr"/>
@@ -8363,7 +8398,7 @@
           <a:p>
             <a:r>
               <a:rPr lang="en-US" dirty="0"/>
-              <a:t>Christopher Thacker</a:t>
+              <a:t>Chris T.</a:t>
             </a:r>
           </a:p>
           <a:p>

</xml_diff>